<commit_message>
small fix on ppt and pdf presentation was also pushed
</commit_message>
<xml_diff>
--- a/presentation/WebApiIntro.pptx
+++ b/presentation/WebApiIntro.pptx
@@ -270,7 +270,7 @@
           <a:p>
             <a:fld id="{10A62C86-FD78-49FF-9184-AE46E32D6BC7}" type="datetimeFigureOut">
               <a:rPr lang="en-US" smtClean="0"/>
-              <a:t>4/16/21</a:t>
+              <a:t>4/17/21</a:t>
             </a:fld>
             <a:endParaRPr lang="en-US"/>
           </a:p>
@@ -436,7 +436,7 @@
             <a:fld id="{A6465A29-9832-D449-B68A-57E7D1F6F6CA}" type="datetimeFigureOut">
               <a:rPr lang="en-US" smtClean="0"/>
               <a:pPr/>
-              <a:t>4/16/21</a:t>
+              <a:t>4/17/21</a:t>
             </a:fld>
             <a:endParaRPr lang="en-US"/>
           </a:p>
@@ -2464,7 +2464,7 @@
             <a:fld id="{8FA71669-B69F-0344-94E1-CE249BCD0641}" type="datetimeFigureOut">
               <a:rPr lang="en-US" smtClean="0"/>
               <a:pPr/>
-              <a:t>4/16/21</a:t>
+              <a:t>4/17/21</a:t>
             </a:fld>
             <a:endParaRPr lang="en-US"/>
           </a:p>
@@ -3794,10 +3794,9 @@
           <a:lstStyle/>
           <a:p>
             <a:r>
-              <a:rPr lang="en-US"/>
+              <a:rPr lang="en-US" dirty="0"/>
               <a:t>Example</a:t>
             </a:r>
-            <a:endParaRPr lang="en-US" dirty="0"/>
           </a:p>
         </p:txBody>
       </p:sp>
@@ -3812,23 +3811,16 @@
         <p:spPr>
           <a:xfrm>
             <a:off x="381000" y="2514600"/>
-            <a:ext cx="8382000" cy="3305521"/>
+            <a:ext cx="8382000" cy="2502223"/>
           </a:xfrm>
           <a:prstGeom prst="rect">
             <a:avLst/>
           </a:prstGeom>
+          <a:noFill/>
           <a:ln>
-            <a:solidFill>
-              <a:schemeClr val="tx1"/>
-            </a:solidFill>
+            <a:noFill/>
           </a:ln>
-          <a:effectLst>
-            <a:outerShdw blurRad="127000" dist="127000" dir="2700000" algn="br">
-              <a:srgbClr val="000000">
-                <a:alpha val="43000"/>
-              </a:srgbClr>
-            </a:outerShdw>
-          </a:effectLst>
+          <a:effectLst/>
         </p:spPr>
         <p:txBody>
           <a:bodyPr vert="horz" wrap="square">
@@ -3860,107 +3852,38 @@
                 <a:ln>
                   <a:noFill/>
                 </a:ln>
-                <a:solidFill>
-                  <a:schemeClr val="tx1"/>
-                </a:solidFill>
                 <a:effectLst/>
                 <a:uLnTx/>
                 <a:uFillTx/>
                 <a:latin typeface="+mn-lt"/>
               </a:rPr>
-              <a:t>&lt;book </a:t>
+              <a:t>&lt;book price = “</a:t>
+            </a:r>
+            <a:r>
+              <a:rPr lang="en-US" dirty="0"/>
+              <a:t>95</a:t>
             </a:r>
             <a:r>
               <a:rPr kumimoji="0" lang="en-US" b="0" i="0" u="none" strike="noStrike" kern="1200" cap="none" spc="0" normalizeH="0" baseline="0" noProof="0" dirty="0">
                 <a:ln>
                   <a:noFill/>
                 </a:ln>
-                <a:solidFill>
-                  <a:srgbClr val="FF6699"/>
-                </a:solidFill>
                 <a:effectLst/>
                 <a:uLnTx/>
                 <a:uFillTx/>
                 <a:latin typeface="+mn-lt"/>
               </a:rPr>
-              <a:t>price</a:t>
+              <a:t>” currency = “</a:t>
+            </a:r>
+            <a:r>
+              <a:rPr lang="en-US" dirty="0"/>
+              <a:t>USD</a:t>
             </a:r>
             <a:r>
               <a:rPr kumimoji="0" lang="en-US" b="0" i="0" u="none" strike="noStrike" kern="1200" cap="none" spc="0" normalizeH="0" baseline="0" noProof="0" dirty="0">
                 <a:ln>
                   <a:noFill/>
                 </a:ln>
-                <a:solidFill>
-                  <a:schemeClr val="tx1"/>
-                </a:solidFill>
-                <a:effectLst/>
-                <a:uLnTx/>
-                <a:uFillTx/>
-                <a:latin typeface="+mn-lt"/>
-              </a:rPr>
-              <a:t> = “</a:t>
-            </a:r>
-            <a:r>
-              <a:rPr lang="en-US" dirty="0"/>
-              <a:t>95</a:t>
-            </a:r>
-            <a:r>
-              <a:rPr kumimoji="0" lang="en-US" b="0" i="0" u="none" strike="noStrike" kern="1200" cap="none" spc="0" normalizeH="0" baseline="0" noProof="0" dirty="0">
-                <a:ln>
-                  <a:noFill/>
-                </a:ln>
-                <a:solidFill>
-                  <a:schemeClr val="tx1"/>
-                </a:solidFill>
-                <a:effectLst/>
-                <a:uLnTx/>
-                <a:uFillTx/>
-                <a:latin typeface="+mn-lt"/>
-              </a:rPr>
-              <a:t>” </a:t>
-            </a:r>
-            <a:r>
-              <a:rPr kumimoji="0" lang="en-US" b="0" i="0" u="none" strike="noStrike" kern="1200" cap="none" spc="0" normalizeH="0" baseline="0" noProof="0" dirty="0">
-                <a:ln>
-                  <a:noFill/>
-                </a:ln>
-                <a:solidFill>
-                  <a:srgbClr val="FF6699"/>
-                </a:solidFill>
-                <a:effectLst/>
-                <a:uLnTx/>
-                <a:uFillTx/>
-                <a:latin typeface="+mn-lt"/>
-              </a:rPr>
-              <a:t>currency</a:t>
-            </a:r>
-            <a:r>
-              <a:rPr kumimoji="0" lang="en-US" b="0" i="0" u="none" strike="noStrike" kern="1200" cap="none" spc="0" normalizeH="0" baseline="0" noProof="0" dirty="0">
-                <a:ln>
-                  <a:noFill/>
-                </a:ln>
-                <a:solidFill>
-                  <a:schemeClr val="tx1"/>
-                </a:solidFill>
-                <a:effectLst/>
-                <a:uLnTx/>
-                <a:uFillTx/>
-                <a:latin typeface="+mn-lt"/>
-              </a:rPr>
-              <a:t> = “</a:t>
-            </a:r>
-            <a:r>
-              <a:rPr lang="en-US" dirty="0"/>
-              <a:t>USD</a:t>
-            </a:r>
-            <a:r>
-              <a:rPr kumimoji="0" lang="en-US" b="0" i="0" u="none" strike="noStrike" kern="1200" cap="none" spc="0" normalizeH="0" baseline="0" noProof="0" dirty="0">
-                <a:ln>
-                  <a:noFill/>
-                </a:ln>
-                <a:solidFill>
-                  <a:schemeClr val="tx1"/>
-                </a:solidFill>
                 <a:effectLst/>
                 <a:uLnTx/>
                 <a:uFillTx/>
@@ -3998,9 +3921,6 @@
                 <a:ln>
                   <a:noFill/>
                 </a:ln>
-                <a:solidFill>
-                  <a:schemeClr val="tx1"/>
-                </a:solidFill>
                 <a:effectLst/>
                 <a:uLnTx/>
                 <a:uFillTx/>
@@ -4017,9 +3937,6 @@
                 <a:ln>
                   <a:noFill/>
                 </a:ln>
-                <a:solidFill>
-                  <a:schemeClr val="tx1"/>
-                </a:solidFill>
                 <a:effectLst/>
                 <a:uLnTx/>
                 <a:uFillTx/>
@@ -4050,9 +3967,6 @@
             </a:pPr>
             <a:r>
               <a:rPr lang="en-US" dirty="0">
-                <a:solidFill>
-                  <a:schemeClr val="tx1"/>
-                </a:solidFill>
                 <a:latin typeface="+mn-lt"/>
               </a:rPr>
               <a:t>	</a:t>
@@ -4062,9 +3976,6 @@
                 <a:ln>
                   <a:noFill/>
                 </a:ln>
-                <a:solidFill>
-                  <a:schemeClr val="tx1"/>
-                </a:solidFill>
                 <a:effectLst/>
                 <a:uLnTx/>
                 <a:uFillTx/>
@@ -4081,9 +3992,6 @@
                 <a:ln>
                   <a:noFill/>
                 </a:ln>
-                <a:solidFill>
-                  <a:schemeClr val="tx1"/>
-                </a:solidFill>
                 <a:effectLst/>
                 <a:uLnTx/>
                 <a:uFillTx/>
@@ -4114,9 +4022,6 @@
             </a:pPr>
             <a:r>
               <a:rPr lang="en-US" dirty="0">
-                <a:solidFill>
-                  <a:schemeClr val="tx1"/>
-                </a:solidFill>
                 <a:latin typeface="+mn-lt"/>
               </a:rPr>
               <a:t>	&lt;publisher&gt; </a:t>
@@ -4127,9 +4032,6 @@
             </a:r>
             <a:r>
               <a:rPr lang="en-US" dirty="0">
-                <a:solidFill>
-                  <a:schemeClr val="tx1"/>
-                </a:solidFill>
                 <a:latin typeface="+mn-lt"/>
               </a:rPr>
               <a:t>&lt;/publisher&gt;</a:t>
@@ -4161,9 +4063,6 @@
             </a:r>
             <a:r>
               <a:rPr lang="en-US" dirty="0">
-                <a:solidFill>
-                  <a:schemeClr val="tx1"/>
-                </a:solidFill>
                 <a:latin typeface="+mn-lt"/>
               </a:rPr>
               <a:t>&lt;edition&gt; </a:t>
@@ -4182,9 +4081,6 @@
             </a:r>
             <a:r>
               <a:rPr lang="en-US" dirty="0">
-                <a:solidFill>
-                  <a:schemeClr val="tx1"/>
-                </a:solidFill>
                 <a:latin typeface="+mn-lt"/>
               </a:rPr>
               <a:t>&lt;/edition&gt;</a:t>
@@ -4215,9 +4111,6 @@
                 <a:ln>
                   <a:noFill/>
                 </a:ln>
-                <a:solidFill>
-                  <a:schemeClr val="tx1"/>
-                </a:solidFill>
                 <a:effectLst/>
                 <a:uLnTx/>
                 <a:uFillTx/>
@@ -4251,9 +4144,6 @@
                 <a:ln>
                   <a:noFill/>
                 </a:ln>
-                <a:solidFill>
-                  <a:schemeClr val="tx1"/>
-                </a:solidFill>
                 <a:effectLst/>
                 <a:uLnTx/>
                 <a:uFillTx/>
@@ -4270,9 +4160,6 @@
                 <a:ln>
                   <a:noFill/>
                 </a:ln>
-                <a:solidFill>
-                  <a:schemeClr val="tx1"/>
-                </a:solidFill>
                 <a:effectLst/>
                 <a:uLnTx/>
                 <a:uFillTx/>
@@ -4285,9 +4172,6 @@
                 <a:ln>
                   <a:noFill/>
                 </a:ln>
-                <a:solidFill>
-                  <a:schemeClr val="tx1"/>
-                </a:solidFill>
                 <a:effectLst/>
                 <a:uLnTx/>
                 <a:uFillTx/>
@@ -4321,9 +4205,6 @@
                 <a:ln>
                   <a:noFill/>
                 </a:ln>
-                <a:solidFill>
-                  <a:schemeClr val="tx1"/>
-                </a:solidFill>
                 <a:effectLst/>
                 <a:uLnTx/>
                 <a:uFillTx/>
@@ -5708,7 +5589,7 @@
             <a:graphicData uri="http://schemas.openxmlformats.org/presentationml/2006/ole">
               <mc:AlternateContent xmlns:mc="http://schemas.openxmlformats.org/markup-compatibility/2006">
                 <mc:Choice xmlns:v="urn:schemas-microsoft-com:vml" Requires="v">
-                  <p:oleObj spid="_x0000_s1181" name="Visio" r:id="rId3" imgW="486149" imgH="611929" progId="Visio.Drawing.11">
+                  <p:oleObj spid="_x0000_s1185" name="Visio" r:id="rId3" imgW="486149" imgH="611929" progId="Visio.Drawing.11">
                     <p:embed/>
                   </p:oleObj>
                 </mc:Choice>
@@ -5809,7 +5690,7 @@
             <a:graphicData uri="http://schemas.openxmlformats.org/presentationml/2006/ole">
               <mc:AlternateContent xmlns:mc="http://schemas.openxmlformats.org/markup-compatibility/2006">
                 <mc:Choice xmlns:v="urn:schemas-microsoft-com:vml" Requires="v">
-                  <p:oleObj spid="_x0000_s1182" name="Visio" r:id="rId5" imgW="680809" imgH="822561" progId="Visio.Drawing.11">
+                  <p:oleObj spid="_x0000_s1186" name="Visio" r:id="rId5" imgW="680809" imgH="822561" progId="Visio.Drawing.11">
                     <p:embed/>
                   </p:oleObj>
                 </mc:Choice>
@@ -6121,7 +6002,7 @@
             <a:graphicData uri="http://schemas.openxmlformats.org/presentationml/2006/ole">
               <mc:AlternateContent xmlns:mc="http://schemas.openxmlformats.org/markup-compatibility/2006">
                 <mc:Choice xmlns:v="urn:schemas-microsoft-com:vml" Requires="v">
-                  <p:oleObj spid="_x0000_s1183" name="Visio" r:id="rId7" imgW="486149" imgH="611929" progId="Visio.Drawing.11">
+                  <p:oleObj spid="_x0000_s1187" name="Visio" r:id="rId7" imgW="486149" imgH="611929" progId="Visio.Drawing.11">
                     <p:embed/>
                   </p:oleObj>
                 </mc:Choice>
@@ -6222,7 +6103,7 @@
             <a:graphicData uri="http://schemas.openxmlformats.org/presentationml/2006/ole">
               <mc:AlternateContent xmlns:mc="http://schemas.openxmlformats.org/markup-compatibility/2006">
                 <mc:Choice xmlns:v="urn:schemas-microsoft-com:vml" Requires="v">
-                  <p:oleObj spid="_x0000_s1184" name="Visio" r:id="rId8" imgW="486149" imgH="611929" progId="Visio.Drawing.11">
+                  <p:oleObj spid="_x0000_s1188" name="Visio" r:id="rId8" imgW="486149" imgH="611929" progId="Visio.Drawing.11">
                     <p:embed/>
                   </p:oleObj>
                 </mc:Choice>

</xml_diff>